<commit_message>
Speed of Puck change in all states
Easy, medium, hard changes the speed of the puck too.
</commit_message>
<xml_diff>
--- a/www/Air Hockey & Game Table poster.pptx
+++ b/www/Air Hockey & Game Table poster.pptx
@@ -216,7 +216,7 @@
   </p:defaultTextStyle>
   <p:extLst>
     <p:ext uri="{EFAFB233-063F-42B5-8137-9DF3F51BA10A}">
-      <p15:sldGuideLst xmlns="" xmlns:p15="http://schemas.microsoft.com/office/powerpoint/2012/main">
+      <p15:sldGuideLst xmlns:p15="http://schemas.microsoft.com/office/powerpoint/2012/main">
         <p15:guide id="1" orient="horz" pos="10368">
           <p15:clr>
             <a:srgbClr val="A4A3A4"/>
@@ -9730,7 +9730,7 @@
               <a:buNone/>
             </a:pPr>
             <a:r>
-              <a:rPr lang="en-US" sz="8000" b="0" i="0" u="none" strike="noStrike" cap="none" baseline="0" dirty="0" smtClean="0">
+              <a:rPr lang="en-US" sz="8000" b="0" i="0" u="none" strike="noStrike" cap="none" baseline="0" dirty="0">
                 <a:solidFill>
                   <a:schemeClr val="dk1"/>
                 </a:solidFill>
@@ -9740,18 +9740,6 @@
                 <a:sym typeface="Calibri"/>
               </a:rPr>
               <a:t>Game Table &amp; Air Hockey Game</a:t>
-            </a:r>
-            <a:r>
-              <a:rPr lang="en-US" sz="10000" b="0" i="0" u="none" strike="noStrike" cap="none" baseline="0" dirty="0">
-                <a:solidFill>
-                  <a:schemeClr val="dk1"/>
-                </a:solidFill>
-                <a:latin typeface="Calibri"/>
-                <a:ea typeface="Calibri"/>
-                <a:cs typeface="Calibri"/>
-                <a:sym typeface="Calibri"/>
-              </a:rPr>
-              <a:t/>
             </a:r>
             <a:br>
               <a:rPr lang="en-US" sz="10000" b="0" i="0" u="none" strike="noStrike" cap="none" baseline="0" dirty="0">
@@ -9765,7 +9753,7 @@
               </a:rPr>
             </a:br>
             <a:r>
-              <a:rPr lang="en-US" sz="5400" dirty="0" smtClean="0">
+              <a:rPr lang="en-US" sz="5400" dirty="0">
                 <a:solidFill>
                   <a:schemeClr val="dk1"/>
                 </a:solidFill>
@@ -9774,22 +9762,10 @@
                 <a:cs typeface="Calibri"/>
                 <a:sym typeface="Calibri"/>
               </a:rPr>
-              <a:t>John Redden, </a:t>
+              <a:t>John Redden, Cory Lewis, Paul </a:t>
             </a:r>
             <a:r>
-              <a:rPr lang="en-US" sz="5400" dirty="0" smtClean="0">
-                <a:solidFill>
-                  <a:schemeClr val="dk1"/>
-                </a:solidFill>
-                <a:latin typeface="Calibri"/>
-                <a:ea typeface="Calibri"/>
-                <a:cs typeface="Calibri"/>
-                <a:sym typeface="Calibri"/>
-              </a:rPr>
-              <a:t>Cory Lewis, Paul </a:t>
-            </a:r>
-            <a:r>
-              <a:rPr lang="en-US" sz="5400" dirty="0" err="1" smtClean="0">
+              <a:rPr lang="en-US" sz="5400" dirty="0" err="1">
                 <a:solidFill>
                   <a:schemeClr val="dk1"/>
                 </a:solidFill>
@@ -9801,7 +9777,7 @@
               <a:t>Becera</a:t>
             </a:r>
             <a:r>
-              <a:rPr lang="en-US" sz="5400" dirty="0" smtClean="0">
+              <a:rPr lang="en-US" sz="5400" dirty="0">
                 <a:solidFill>
                   <a:schemeClr val="dk1"/>
                 </a:solidFill>
@@ -10099,7 +10075,7 @@
               <a:buChar char="●"/>
             </a:pPr>
             <a:r>
-              <a:rPr lang="en-US" sz="3600" dirty="0" smtClean="0">
+              <a:rPr lang="en-US" sz="3600" dirty="0">
                 <a:solidFill>
                   <a:schemeClr val="dk1"/>
                 </a:solidFill>
@@ -10130,7 +10106,7 @@
               <a:buChar char="●"/>
             </a:pPr>
             <a:r>
-              <a:rPr lang="en-US" sz="3600" b="0" i="0" u="none" strike="noStrike" cap="none" baseline="0" dirty="0" smtClean="0">
+              <a:rPr lang="en-US" sz="3600" b="0" i="0" u="none" strike="noStrike" cap="none" baseline="0" dirty="0">
                 <a:solidFill>
                   <a:schemeClr val="dk1"/>
                 </a:solidFill>
@@ -10161,7 +10137,7 @@
               <a:buChar char="●"/>
             </a:pPr>
             <a:r>
-              <a:rPr lang="en-US" sz="3600" dirty="0" smtClean="0">
+              <a:rPr lang="en-US" sz="3600" dirty="0">
                 <a:solidFill>
                   <a:schemeClr val="dk1"/>
                 </a:solidFill>
@@ -10225,7 +10201,7 @@
               <a:buSzPct val="25000"/>
             </a:pPr>
             <a:r>
-              <a:rPr lang="en-US" sz="3600" dirty="0" smtClean="0">
+              <a:rPr lang="en-US" sz="3600" dirty="0">
                 <a:latin typeface="Times New Roman" pitchFamily="18" charset="0"/>
                 <a:ea typeface="Calibri"/>
                 <a:cs typeface="Times New Roman" pitchFamily="18" charset="0"/>
@@ -10273,7 +10249,7 @@
               </a:buClr>
               <a:buSzPct val="25000"/>
             </a:pPr>
-            <a:endParaRPr lang="en-US" sz="3600" dirty="0" smtClean="0">
+            <a:endParaRPr lang="en-US" sz="3600" dirty="0">
               <a:latin typeface="Times New Roman" pitchFamily="18" charset="0"/>
               <a:ea typeface="Calibri"/>
               <a:cs typeface="Times New Roman" pitchFamily="18" charset="0"/>
@@ -10299,7 +10275,7 @@
               <a:buChar char="•"/>
             </a:pPr>
             <a:r>
-              <a:rPr lang="en-US" sz="3600" dirty="0" smtClean="0">
+              <a:rPr lang="en-US" sz="3600" dirty="0">
                 <a:latin typeface="Times New Roman" pitchFamily="18" charset="0"/>
                 <a:ea typeface="Calibri"/>
                 <a:cs typeface="Times New Roman" pitchFamily="18" charset="0"/>
@@ -10352,7 +10328,7 @@
               <a:buChar char="•"/>
             </a:pPr>
             <a:r>
-              <a:rPr lang="en-US" sz="3600" dirty="0" smtClean="0">
+              <a:rPr lang="en-US" sz="3600" dirty="0">
                 <a:latin typeface="Times New Roman" pitchFamily="18" charset="0"/>
                 <a:ea typeface="Calibri"/>
                 <a:cs typeface="Times New Roman" pitchFamily="18" charset="0"/>
@@ -10405,7 +10381,7 @@
               <a:buChar char="•"/>
             </a:pPr>
             <a:r>
-              <a:rPr lang="en-US" sz="3600" dirty="0" smtClean="0">
+              <a:rPr lang="en-US" sz="3600" dirty="0">
                 <a:latin typeface="Times New Roman" pitchFamily="18" charset="0"/>
                 <a:ea typeface="Calibri"/>
                 <a:cs typeface="Times New Roman" pitchFamily="18" charset="0"/>
@@ -10458,7 +10434,7 @@
               <a:buChar char="•"/>
             </a:pPr>
             <a:r>
-              <a:rPr lang="en-US" sz="3600" dirty="0" smtClean="0">
+              <a:rPr lang="en-US" sz="3600" dirty="0">
                 <a:latin typeface="Times New Roman" pitchFamily="18" charset="0"/>
                 <a:ea typeface="Calibri"/>
                 <a:cs typeface="Times New Roman" pitchFamily="18" charset="0"/>
@@ -10466,12 +10442,6 @@
               </a:rPr>
               <a:t>Art, sound, gameplay, programming, etc..</a:t>
             </a:r>
-            <a:endParaRPr lang="en-US" sz="3600" dirty="0">
-              <a:latin typeface="Times New Roman" pitchFamily="18" charset="0"/>
-              <a:ea typeface="Calibri"/>
-              <a:cs typeface="Times New Roman" pitchFamily="18" charset="0"/>
-              <a:sym typeface="Calibri"/>
-            </a:endParaRPr>
           </a:p>
           <a:p>
             <a:pPr marL="571500" marR="0" lvl="0" indent="-571500" algn="l" rtl="0">
@@ -10535,7 +10505,7 @@
               <a:buSzPct val="25000"/>
             </a:pPr>
             <a:r>
-              <a:rPr lang="en-US" sz="3600" dirty="0" smtClean="0">
+              <a:rPr lang="en-US" sz="3600" dirty="0">
                 <a:latin typeface="Times New Roman" pitchFamily="18" charset="0"/>
                 <a:ea typeface="Calibri"/>
                 <a:cs typeface="Times New Roman" pitchFamily="18" charset="0"/>
@@ -10708,35 +10678,8 @@
                 <a:cs typeface="Calibri"/>
                 <a:sym typeface="Calibri"/>
               </a:rPr>
-              <a:t>Required Design </a:t>
+              <a:t>Required Design Components</a:t>
             </a:r>
-            <a:r>
-              <a:rPr lang="en-US" sz="5400" b="0" i="0" u="none" strike="noStrike" cap="none" baseline="0" dirty="0" smtClean="0">
-                <a:solidFill>
-                  <a:schemeClr val="tx1">
-                    <a:lumMod val="85000"/>
-                    <a:lumOff val="15000"/>
-                  </a:schemeClr>
-                </a:solidFill>
-                <a:latin typeface="Magneto" pitchFamily="82" charset="0"/>
-                <a:ea typeface="Calibri"/>
-                <a:cs typeface="Calibri"/>
-                <a:sym typeface="Calibri"/>
-              </a:rPr>
-              <a:t>Components</a:t>
-            </a:r>
-            <a:endParaRPr lang="en-US" sz="5400" b="0" i="0" u="none" strike="noStrike" cap="none" baseline="0" dirty="0">
-              <a:solidFill>
-                <a:schemeClr val="tx1">
-                  <a:lumMod val="85000"/>
-                  <a:lumOff val="15000"/>
-                </a:schemeClr>
-              </a:solidFill>
-              <a:latin typeface="Magneto" pitchFamily="82" charset="0"/>
-              <a:ea typeface="Calibri"/>
-              <a:cs typeface="Calibri"/>
-              <a:sym typeface="Calibri"/>
-            </a:endParaRPr>
           </a:p>
         </p:txBody>
       </p:sp>
@@ -10802,7 +10745,7 @@
               <a:buNone/>
             </a:pPr>
             <a:r>
-              <a:rPr lang="en-US" sz="6600" dirty="0" smtClean="0">
+              <a:rPr lang="en-US" sz="6600" dirty="0">
                 <a:solidFill>
                   <a:schemeClr val="tx1">
                     <a:lumMod val="85000"/>
@@ -10874,7 +10817,7 @@
               <a:buNone/>
             </a:pPr>
             <a:r>
-              <a:rPr lang="en-US" sz="5400" b="1" i="0" u="none" strike="noStrike" cap="none" baseline="0" dirty="0" smtClean="0">
+              <a:rPr lang="en-US" sz="5400" b="1" i="0" u="none" strike="noStrike" cap="none" baseline="0" dirty="0">
                 <a:solidFill>
                   <a:srgbClr val="000000"/>
                 </a:solidFill>
@@ -10885,7 +10828,7 @@
               </a:rPr>
               <a:t>Prototype</a:t>
             </a:r>
-            <a:endParaRPr lang="en-US" sz="3600" b="1" i="0" u="none" strike="noStrike" cap="none" baseline="0" dirty="0" smtClean="0">
+            <a:endParaRPr lang="en-US" sz="3600" b="1" i="0" u="none" strike="noStrike" cap="none" baseline="0" dirty="0">
               <a:solidFill>
                 <a:srgbClr val="000000"/>
               </a:solidFill>
@@ -10914,7 +10857,7 @@
               <a:buNone/>
             </a:pPr>
             <a:r>
-              <a:rPr lang="en-US" sz="3600" dirty="0" smtClean="0">
+              <a:rPr lang="en-US" sz="3600" dirty="0">
                 <a:latin typeface="Calibri"/>
                 <a:ea typeface="Calibri"/>
                 <a:cs typeface="Calibri"/>
@@ -10922,7 +10865,7 @@
               </a:rPr>
               <a:t>Originally designed and made by john redden.</a:t>
             </a:r>
-            <a:endParaRPr lang="en-US" sz="3600" b="0" i="0" u="none" strike="noStrike" cap="none" baseline="0" dirty="0" smtClean="0">
+            <a:endParaRPr lang="en-US" sz="3600" b="0" i="0" u="none" strike="noStrike" cap="none" baseline="0" dirty="0">
               <a:solidFill>
                 <a:srgbClr val="000000"/>
               </a:solidFill>
@@ -10977,7 +10920,7 @@
               <a:buNone/>
             </a:pPr>
             <a:r>
-              <a:rPr lang="en-US" sz="4800" b="1" i="0" u="none" strike="noStrike" cap="none" baseline="0" dirty="0" smtClean="0">
+              <a:rPr lang="en-US" sz="4800" b="1" i="0" u="none" strike="noStrike" cap="none" baseline="0" dirty="0">
                 <a:solidFill>
                   <a:srgbClr val="000000"/>
                 </a:solidFill>
@@ -11008,7 +10951,7 @@
               <a:buNone/>
             </a:pPr>
             <a:r>
-              <a:rPr lang="en-US" sz="3600" dirty="0" smtClean="0">
+              <a:rPr lang="en-US" sz="3600" dirty="0">
                 <a:latin typeface="Calibri"/>
                 <a:ea typeface="Calibri"/>
                 <a:cs typeface="Calibri"/>
@@ -11036,7 +10979,7 @@
               <a:buNone/>
             </a:pPr>
             <a:r>
-              <a:rPr lang="en-US" sz="3600" dirty="0" smtClean="0">
+              <a:rPr lang="en-US" sz="3600" dirty="0">
                 <a:latin typeface="Calibri"/>
                 <a:ea typeface="Calibri"/>
                 <a:cs typeface="Calibri"/>
@@ -11134,7 +11077,7 @@
               <a:buNone/>
             </a:pPr>
             <a:r>
-              <a:rPr lang="en-US" sz="6600" b="0" i="0" u="none" strike="noStrike" cap="none" baseline="0" dirty="0" smtClean="0">
+              <a:rPr lang="en-US" sz="6600" b="0" i="0" u="none" strike="noStrike" cap="none" baseline="0" dirty="0">
                 <a:solidFill>
                   <a:schemeClr val="tx1">
                     <a:lumMod val="85000"/>
@@ -11148,18 +11091,6 @@
               </a:rPr>
               <a:t>Code</a:t>
             </a:r>
-            <a:endParaRPr lang="en-US" sz="6600" b="0" i="0" u="none" strike="noStrike" cap="none" baseline="0" dirty="0">
-              <a:solidFill>
-                <a:schemeClr val="tx1">
-                  <a:lumMod val="85000"/>
-                  <a:lumOff val="15000"/>
-                </a:schemeClr>
-              </a:solidFill>
-              <a:latin typeface="Magneto" pitchFamily="82" charset="0"/>
-              <a:ea typeface="Calibri"/>
-              <a:cs typeface="Calibri"/>
-              <a:sym typeface="Calibri"/>
-            </a:endParaRPr>
           </a:p>
         </p:txBody>
       </p:sp>
@@ -11315,19 +11246,7 @@
                 <a:cs typeface="Calibri"/>
                 <a:sym typeface="Calibri"/>
               </a:rPr>
-              <a:t>The SURGE Program, </a:t>
-            </a:r>
-            <a:r>
-              <a:rPr lang="en-US" sz="3600" b="0" i="0" u="none" strike="noStrike" cap="none" baseline="0" dirty="0" smtClean="0">
-                <a:solidFill>
-                  <a:srgbClr val="000000"/>
-                </a:solidFill>
-                <a:latin typeface="Calibri"/>
-                <a:ea typeface="Calibri"/>
-                <a:cs typeface="Calibri"/>
-                <a:sym typeface="Calibri"/>
-              </a:rPr>
-              <a:t>John Redden, Dr. Lawrence Owens, Duane Goodwin.</a:t>
+              <a:t>The SURGE Program, John Redden, Dr. Lawrence Owens, Duane Goodwin.</a:t>
             </a:r>
           </a:p>
           <a:p>
@@ -11617,6 +11536,30 @@
               </a14:hiddenFill>
             </a:ext>
           </a:extLst>
+        </p:spPr>
+      </p:pic>
+      <p:pic>
+        <p:nvPicPr>
+          <p:cNvPr id="6" name="Picture 5"/>
+          <p:cNvPicPr>
+            <a:picLocks noChangeAspect="1"/>
+          </p:cNvPicPr>
+          <p:nvPr/>
+        </p:nvPicPr>
+        <p:blipFill>
+          <a:blip r:embed="rId9"/>
+          <a:stretch>
+            <a:fillRect/>
+          </a:stretch>
+        </p:blipFill>
+        <p:spPr>
+          <a:xfrm rot="5400000">
+            <a:off x="31732416" y="7220731"/>
+            <a:ext cx="9320513" cy="6990385"/>
+          </a:xfrm>
+          <a:prstGeom prst="rect">
+            <a:avLst/>
+          </a:prstGeom>
         </p:spPr>
       </p:pic>
     </p:spTree>

</xml_diff>